<commit_message>
Streams part1 final version
</commit_message>
<xml_diff>
--- a/07-cvicenie/cvicenie07.pptx
+++ b/07-cvicenie/cvicenie07.pptx
@@ -111,6 +111,11 @@
       </a:defRPr>
     </a:lvl9pPr>
   </p:defaultTextStyle>
+  <p:extLst>
+    <p:ext uri="{EFAFB233-063F-42B5-8137-9DF3F51BA10A}">
+      <p15:sldGuideLst xmlns:p15="http://schemas.microsoft.com/office/powerpoint/2012/main"/>
+    </p:ext>
+  </p:extLst>
 </p:presentation>
 </file>
 
@@ -261,7 +266,7 @@
           <a:p>
             <a:fld id="{9D2349FF-49C3-5F4A-AB03-4F06B5BF3E1A}" type="datetimeFigureOut">
               <a:rPr lang="en-US" smtClean="0"/>
-              <a:t>10/28/18</a:t>
+              <a:t>11/5/18</a:t>
             </a:fld>
             <a:endParaRPr lang="en-US"/>
           </a:p>
@@ -459,7 +464,7 @@
           <a:p>
             <a:fld id="{9D2349FF-49C3-5F4A-AB03-4F06B5BF3E1A}" type="datetimeFigureOut">
               <a:rPr lang="en-US" smtClean="0"/>
-              <a:t>10/28/18</a:t>
+              <a:t>11/5/18</a:t>
             </a:fld>
             <a:endParaRPr lang="en-US"/>
           </a:p>
@@ -667,7 +672,7 @@
           <a:p>
             <a:fld id="{9D2349FF-49C3-5F4A-AB03-4F06B5BF3E1A}" type="datetimeFigureOut">
               <a:rPr lang="en-US" smtClean="0"/>
-              <a:t>10/28/18</a:t>
+              <a:t>11/5/18</a:t>
             </a:fld>
             <a:endParaRPr lang="en-US"/>
           </a:p>
@@ -865,7 +870,7 @@
           <a:p>
             <a:fld id="{9D2349FF-49C3-5F4A-AB03-4F06B5BF3E1A}" type="datetimeFigureOut">
               <a:rPr lang="en-US" smtClean="0"/>
-              <a:t>10/28/18</a:t>
+              <a:t>11/5/18</a:t>
             </a:fld>
             <a:endParaRPr lang="en-US"/>
           </a:p>
@@ -1140,7 +1145,7 @@
           <a:p>
             <a:fld id="{9D2349FF-49C3-5F4A-AB03-4F06B5BF3E1A}" type="datetimeFigureOut">
               <a:rPr lang="en-US" smtClean="0"/>
-              <a:t>10/28/18</a:t>
+              <a:t>11/5/18</a:t>
             </a:fld>
             <a:endParaRPr lang="en-US"/>
           </a:p>
@@ -1405,7 +1410,7 @@
           <a:p>
             <a:fld id="{9D2349FF-49C3-5F4A-AB03-4F06B5BF3E1A}" type="datetimeFigureOut">
               <a:rPr lang="en-US" smtClean="0"/>
-              <a:t>10/28/18</a:t>
+              <a:t>11/5/18</a:t>
             </a:fld>
             <a:endParaRPr lang="en-US"/>
           </a:p>
@@ -1817,7 +1822,7 @@
           <a:p>
             <a:fld id="{9D2349FF-49C3-5F4A-AB03-4F06B5BF3E1A}" type="datetimeFigureOut">
               <a:rPr lang="en-US" smtClean="0"/>
-              <a:t>10/28/18</a:t>
+              <a:t>11/5/18</a:t>
             </a:fld>
             <a:endParaRPr lang="en-US"/>
           </a:p>
@@ -1958,7 +1963,7 @@
           <a:p>
             <a:fld id="{9D2349FF-49C3-5F4A-AB03-4F06B5BF3E1A}" type="datetimeFigureOut">
               <a:rPr lang="en-US" smtClean="0"/>
-              <a:t>10/28/18</a:t>
+              <a:t>11/5/18</a:t>
             </a:fld>
             <a:endParaRPr lang="en-US"/>
           </a:p>
@@ -2071,7 +2076,7 @@
           <a:p>
             <a:fld id="{9D2349FF-49C3-5F4A-AB03-4F06B5BF3E1A}" type="datetimeFigureOut">
               <a:rPr lang="en-US" smtClean="0"/>
-              <a:t>10/28/18</a:t>
+              <a:t>11/5/18</a:t>
             </a:fld>
             <a:endParaRPr lang="en-US"/>
           </a:p>
@@ -2382,7 +2387,7 @@
           <a:p>
             <a:fld id="{9D2349FF-49C3-5F4A-AB03-4F06B5BF3E1A}" type="datetimeFigureOut">
               <a:rPr lang="en-US" smtClean="0"/>
-              <a:t>10/28/18</a:t>
+              <a:t>11/5/18</a:t>
             </a:fld>
             <a:endParaRPr lang="en-US"/>
           </a:p>
@@ -2670,7 +2675,7 @@
           <a:p>
             <a:fld id="{9D2349FF-49C3-5F4A-AB03-4F06B5BF3E1A}" type="datetimeFigureOut">
               <a:rPr lang="en-US" smtClean="0"/>
-              <a:t>10/28/18</a:t>
+              <a:t>11/5/18</a:t>
             </a:fld>
             <a:endParaRPr lang="en-US"/>
           </a:p>
@@ -2911,7 +2916,7 @@
           <a:p>
             <a:fld id="{9D2349FF-49C3-5F4A-AB03-4F06B5BF3E1A}" type="datetimeFigureOut">
               <a:rPr lang="en-US" smtClean="0"/>
-              <a:t>10/28/18</a:t>
+              <a:t>11/5/18</a:t>
             </a:fld>
             <a:endParaRPr lang="en-US"/>
           </a:p>
@@ -3491,6 +3496,192 @@
             </a:r>
             <a:endParaRPr lang="en-US" dirty="0"/>
           </a:p>
+          <a:p>
+            <a:r>
+              <a:rPr lang="en-US" dirty="0" err="1"/>
+              <a:t>Hodnotíme</a:t>
+            </a:r>
+            <a:r>
+              <a:rPr lang="en-US" dirty="0"/>
+              <a:t> </a:t>
+            </a:r>
+            <a:r>
+              <a:rPr lang="en-US" dirty="0" err="1"/>
+              <a:t>na</a:t>
+            </a:r>
+            <a:r>
+              <a:rPr lang="en-US" dirty="0"/>
+              <a:t> </a:t>
+            </a:r>
+            <a:r>
+              <a:rPr lang="en-US" dirty="0" err="1"/>
+              <a:t>záver</a:t>
+            </a:r>
+            <a:r>
+              <a:rPr lang="en-US" dirty="0"/>
+              <a:t> </a:t>
+            </a:r>
+            <a:r>
+              <a:rPr lang="en-US" dirty="0" err="1"/>
+              <a:t>cvičenia</a:t>
+            </a:r>
+            <a:r>
+              <a:rPr lang="en-US" dirty="0"/>
+              <a:t> </a:t>
+            </a:r>
+          </a:p>
+          <a:p>
+            <a:r>
+              <a:rPr lang="en-US" dirty="0"/>
+              <a:t>a </a:t>
+            </a:r>
+            <a:r>
+              <a:rPr lang="en-US" dirty="0" err="1"/>
+              <a:t>čo</a:t>
+            </a:r>
+            <a:r>
+              <a:rPr lang="en-US" dirty="0"/>
+              <a:t> </a:t>
+            </a:r>
+            <a:r>
+              <a:rPr lang="en-US" dirty="0" err="1"/>
+              <a:t>sa</a:t>
+            </a:r>
+            <a:r>
+              <a:rPr lang="en-US" dirty="0"/>
+              <a:t> </a:t>
+            </a:r>
+            <a:r>
+              <a:rPr lang="en-US" dirty="0" err="1"/>
+              <a:t>nestihne</a:t>
+            </a:r>
+            <a:r>
+              <a:rPr lang="en-US" dirty="0"/>
+              <a:t> </a:t>
+            </a:r>
+            <a:r>
+              <a:rPr lang="en-US" dirty="0" err="1"/>
+              <a:t>tak</a:t>
+            </a:r>
+            <a:r>
+              <a:rPr lang="en-US" dirty="0"/>
+              <a:t> o </a:t>
+            </a:r>
+            <a:r>
+              <a:rPr lang="en-US" dirty="0" err="1"/>
+              <a:t>týždeň</a:t>
+            </a:r>
+            <a:r>
+              <a:rPr lang="en-US" dirty="0"/>
+              <a:t> </a:t>
+            </a:r>
+            <a:r>
+              <a:rPr lang="en-US" dirty="0" err="1"/>
+              <a:t>na</a:t>
+            </a:r>
+            <a:r>
+              <a:rPr lang="en-US" dirty="0"/>
+              <a:t> </a:t>
+            </a:r>
+            <a:r>
+              <a:rPr lang="en-US" dirty="0" err="1"/>
+              <a:t>cviku</a:t>
+            </a:r>
+            <a:r>
+              <a:rPr lang="en-US" dirty="0"/>
+              <a:t> – </a:t>
+            </a:r>
+          </a:p>
+          <a:p>
+            <a:pPr lvl="1"/>
+            <a:r>
+              <a:rPr lang="en-US" dirty="0" err="1"/>
+              <a:t>čo</a:t>
+            </a:r>
+            <a:r>
+              <a:rPr lang="en-US" dirty="0"/>
+              <a:t> </a:t>
+            </a:r>
+            <a:r>
+              <a:rPr lang="en-US" dirty="0" err="1"/>
+              <a:t>sa</a:t>
+            </a:r>
+            <a:r>
+              <a:rPr lang="en-US" dirty="0"/>
+              <a:t> </a:t>
+            </a:r>
+            <a:r>
+              <a:rPr lang="en-US" dirty="0" err="1"/>
+              <a:t>nestihne</a:t>
+            </a:r>
+            <a:r>
+              <a:rPr lang="en-US" dirty="0"/>
+              <a:t> a </a:t>
+            </a:r>
+            <a:r>
+              <a:rPr lang="en-US" dirty="0" err="1"/>
+              <a:t>robíte</a:t>
+            </a:r>
+            <a:r>
+              <a:rPr lang="en-US" dirty="0"/>
+              <a:t> </a:t>
+            </a:r>
+            <a:r>
+              <a:rPr lang="en-US" dirty="0" err="1"/>
+              <a:t>doma</a:t>
+            </a:r>
+            <a:r>
+              <a:rPr lang="en-US" dirty="0"/>
+              <a:t> - </a:t>
+            </a:r>
+            <a:r>
+              <a:rPr lang="en-US" dirty="0" err="1"/>
+              <a:t>musí</a:t>
+            </a:r>
+            <a:r>
+              <a:rPr lang="en-US" dirty="0"/>
+              <a:t> </a:t>
+            </a:r>
+            <a:r>
+              <a:rPr lang="en-US" dirty="0" err="1"/>
+              <a:t>byť</a:t>
+            </a:r>
+            <a:r>
+              <a:rPr lang="en-US" dirty="0"/>
+              <a:t> </a:t>
+            </a:r>
+            <a:r>
+              <a:rPr lang="en-US" b="1" i="1" dirty="0"/>
+              <a:t>tip top, </a:t>
+            </a:r>
+          </a:p>
+          <a:p>
+            <a:pPr lvl="1"/>
+            <a:r>
+              <a:rPr lang="en-US" dirty="0" err="1"/>
+              <a:t>kód</a:t>
+            </a:r>
+            <a:r>
+              <a:rPr lang="en-US" dirty="0"/>
+              <a:t> </a:t>
+            </a:r>
+            <a:r>
+              <a:rPr lang="en-US" dirty="0" err="1"/>
+              <a:t>aj</a:t>
+            </a:r>
+            <a:r>
+              <a:rPr lang="en-US" dirty="0"/>
+              <a:t> </a:t>
+            </a:r>
+            <a:r>
+              <a:rPr lang="en-US" dirty="0" err="1"/>
+              <a:t>poriadne</a:t>
+            </a:r>
+            <a:r>
+              <a:rPr lang="en-US" dirty="0"/>
+              <a:t> testy	</a:t>
+            </a:r>
+          </a:p>
         </p:txBody>
       </p:sp>
     </p:spTree>
@@ -3858,7 +4049,7 @@
           <a:p>
             <a:r>
               <a:rPr lang="en-US" dirty="0"/>
-              <a:t>implement transform streams with this functionality</a:t>
+              <a:t>implement transform streams with add BOM remove BOM functionality</a:t>
             </a:r>
           </a:p>
           <a:p>
@@ -3866,6 +4057,21 @@
               <a:rPr lang="en-US" dirty="0"/>
               <a:t>implement tests 1b</a:t>
             </a:r>
+          </a:p>
+          <a:p>
+            <a:r>
+              <a:rPr lang="en-US" dirty="0" err="1"/>
+              <a:t>src</a:t>
+            </a:r>
+            <a:r>
+              <a:rPr lang="en-US" dirty="0"/>
+              <a:t>/</a:t>
+            </a:r>
+            <a:r>
+              <a:rPr lang="en-US" dirty="0" err="1"/>
+              <a:t>bom.js</a:t>
+            </a:r>
+            <a:endParaRPr lang="en-US" dirty="0"/>
           </a:p>
         </p:txBody>
       </p:sp>
@@ -4017,6 +4223,21 @@
             </a:r>
             <a:endParaRPr lang="en-US" dirty="0"/>
           </a:p>
+          <a:p>
+            <a:r>
+              <a:rPr lang="en-US" dirty="0" err="1"/>
+              <a:t>src</a:t>
+            </a:r>
+            <a:r>
+              <a:rPr lang="en-US" dirty="0"/>
+              <a:t>/</a:t>
+            </a:r>
+            <a:r>
+              <a:rPr lang="en-US" dirty="0" err="1"/>
+              <a:t>fromGenerator.js</a:t>
+            </a:r>
+            <a:endParaRPr lang="en-US" dirty="0"/>
+          </a:p>
         </p:txBody>
       </p:sp>
     </p:spTree>
@@ -4148,6 +4369,27 @@
               <a:t> – 1b</a:t>
             </a:r>
           </a:p>
+          <a:p>
+            <a:r>
+              <a:rPr lang="en-US" dirty="0" err="1"/>
+              <a:t>src</a:t>
+            </a:r>
+            <a:r>
+              <a:rPr lang="en-US" dirty="0"/>
+              <a:t>/</a:t>
+            </a:r>
+            <a:r>
+              <a:rPr lang="en-US" dirty="0" err="1"/>
+              <a:t>strigify.js</a:t>
+            </a:r>
+            <a:endParaRPr lang="en-US" dirty="0"/>
+          </a:p>
+          <a:p>
+            <a:pPr marL="0" indent="0">
+              <a:buNone/>
+            </a:pPr>
+            <a:endParaRPr lang="en-US" dirty="0"/>
+          </a:p>
         </p:txBody>
       </p:sp>
     </p:spTree>
@@ -4207,7 +4449,7 @@
             </a:r>
             <a:r>
               <a:rPr lang="en-US" dirty="0"/>
-              <a:t> – filter, map 1b (+2 bonus)</a:t>
+              <a:t> – filter, map 1b (+2b bonus)</a:t>
             </a:r>
           </a:p>
         </p:txBody>
@@ -4235,7 +4477,9 @@
           </a:xfrm>
         </p:spPr>
         <p:txBody>
-          <a:bodyPr/>
+          <a:bodyPr>
+            <a:normAutofit lnSpcReduction="10000"/>
+          </a:bodyPr>
           <a:lstStyle/>
           <a:p>
             <a:r>
@@ -4282,6 +4526,45 @@
               <a:rPr lang="en-US" dirty="0"/>
               <a:t> promise) 2b bonus</a:t>
             </a:r>
+          </a:p>
+          <a:p>
+            <a:r>
+              <a:rPr lang="en-US" dirty="0" err="1"/>
+              <a:t>Kódujeme</a:t>
+            </a:r>
+            <a:r>
+              <a:rPr lang="en-US" dirty="0"/>
+              <a:t> </a:t>
+            </a:r>
+            <a:r>
+              <a:rPr lang="en-US" dirty="0" err="1"/>
+              <a:t>niečo</a:t>
+            </a:r>
+            <a:r>
+              <a:rPr lang="en-US" dirty="0"/>
+              <a:t> </a:t>
+            </a:r>
+            <a:r>
+              <a:rPr lang="en-US" dirty="0" err="1"/>
+              <a:t>podobné</a:t>
+            </a:r>
+            <a:r>
+              <a:rPr lang="en-US" dirty="0"/>
+              <a:t> </a:t>
+            </a:r>
+            <a:r>
+              <a:rPr lang="en-US" dirty="0" err="1"/>
+              <a:t>ako</a:t>
+            </a:r>
+            <a:r>
+              <a:rPr lang="en-US" dirty="0"/>
+              <a:t> through2 </a:t>
+            </a:r>
+            <a:r>
+              <a:rPr lang="en-US" dirty="0" err="1"/>
+              <a:t>vlastne</a:t>
+            </a:r>
+            <a:endParaRPr lang="en-US" dirty="0"/>
           </a:p>
           <a:p>
             <a:endParaRPr lang="en-US" dirty="0"/>
@@ -4345,15 +4628,7 @@
             </a:r>
             <a:r>
               <a:rPr lang="en-US" dirty="0"/>
-              <a:t> – </a:t>
-            </a:r>
-            <a:r>
-              <a:rPr lang="en-US" dirty="0" err="1"/>
-              <a:t>statefull</a:t>
-            </a:r>
-            <a:r>
-              <a:rPr lang="en-US" dirty="0"/>
-              <a:t> transform filter, object streams, 1b</a:t>
+              <a:t> – stateful transform filter, object streams, 1b</a:t>
             </a:r>
           </a:p>
         </p:txBody>
@@ -4381,7 +4656,9 @@
           </a:xfrm>
         </p:spPr>
         <p:txBody>
-          <a:bodyPr/>
+          <a:bodyPr>
+            <a:normAutofit fontScale="77500" lnSpcReduction="20000"/>
+          </a:bodyPr>
           <a:lstStyle/>
           <a:p>
             <a:r>
@@ -4404,6 +4681,273 @@
               <a:rPr lang="en-US" dirty="0"/>
               <a:t>)</a:t>
             </a:r>
+          </a:p>
+          <a:p>
+            <a:pPr lvl="1"/>
+            <a:r>
+              <a:rPr lang="en-US" dirty="0"/>
+              <a:t>Aka </a:t>
+            </a:r>
+            <a:r>
+              <a:rPr lang="en-US" dirty="0" err="1"/>
+              <a:t>struktura</a:t>
+            </a:r>
+            <a:r>
+              <a:rPr lang="en-US" dirty="0"/>
+              <a:t> </a:t>
+            </a:r>
+            <a:r>
+              <a:rPr lang="en-US" dirty="0" err="1"/>
+              <a:t>je</a:t>
+            </a:r>
+            <a:r>
+              <a:rPr lang="en-US" dirty="0"/>
+              <a:t> </a:t>
+            </a:r>
+            <a:r>
+              <a:rPr lang="en-US" dirty="0" err="1"/>
+              <a:t>vhodna</a:t>
+            </a:r>
+            <a:r>
+              <a:rPr lang="en-US" dirty="0"/>
+              <a:t> </a:t>
+            </a:r>
+            <a:r>
+              <a:rPr lang="en-US" dirty="0" err="1"/>
+              <a:t>na</a:t>
+            </a:r>
+            <a:r>
+              <a:rPr lang="en-US" dirty="0"/>
+              <a:t> </a:t>
+            </a:r>
+            <a:r>
+              <a:rPr lang="en-US" dirty="0" err="1"/>
+              <a:t>odpametavanie</a:t>
+            </a:r>
+            <a:r>
+              <a:rPr lang="en-US" dirty="0"/>
+              <a:t> unique </a:t>
+            </a:r>
+            <a:r>
+              <a:rPr lang="en-US" dirty="0" err="1"/>
+              <a:t>objektov</a:t>
+            </a:r>
+            <a:r>
+              <a:rPr lang="en-US" dirty="0"/>
+              <a:t> ?</a:t>
+            </a:r>
+          </a:p>
+          <a:p>
+            <a:pPr lvl="1"/>
+            <a:r>
+              <a:rPr lang="en-US" dirty="0" err="1"/>
+              <a:t>Ako</a:t>
+            </a:r>
+            <a:r>
+              <a:rPr lang="en-US" dirty="0"/>
+              <a:t> </a:t>
+            </a:r>
+            <a:r>
+              <a:rPr lang="en-US" dirty="0" err="1"/>
+              <a:t>chceme</a:t>
+            </a:r>
+            <a:r>
+              <a:rPr lang="en-US" dirty="0"/>
+              <a:t> </a:t>
+            </a:r>
+            <a:r>
+              <a:rPr lang="en-US" dirty="0" err="1"/>
+              <a:t>definovat</a:t>
+            </a:r>
+            <a:r>
+              <a:rPr lang="en-US" dirty="0"/>
+              <a:t> unique ?</a:t>
+            </a:r>
+          </a:p>
+          <a:p>
+            <a:pPr lvl="1"/>
+            <a:r>
+              <a:rPr lang="en-US" dirty="0"/>
+              <a:t>V </a:t>
+            </a:r>
+            <a:r>
+              <a:rPr lang="en-US" dirty="0" err="1"/>
+              <a:t>prvom</a:t>
+            </a:r>
+            <a:r>
+              <a:rPr lang="en-US" dirty="0"/>
+              <a:t> </a:t>
+            </a:r>
+            <a:r>
+              <a:rPr lang="en-US" dirty="0" err="1"/>
+              <a:t>priblizeni</a:t>
+            </a:r>
+            <a:r>
+              <a:rPr lang="en-US" dirty="0"/>
+              <a:t> </a:t>
+            </a:r>
+            <a:r>
+              <a:rPr lang="en-US" dirty="0" err="1"/>
+              <a:t>staci</a:t>
+            </a:r>
+            <a:r>
+              <a:rPr lang="en-US" dirty="0"/>
+              <a:t> </a:t>
+            </a:r>
+            <a:r>
+              <a:rPr lang="en-US" dirty="0" err="1"/>
+              <a:t>nad</a:t>
+            </a:r>
+            <a:r>
+              <a:rPr lang="en-US" dirty="0"/>
+              <a:t> </a:t>
+            </a:r>
+            <a:r>
+              <a:rPr lang="en-US" b="1" dirty="0"/>
+              <a:t>numbers a </a:t>
+            </a:r>
+            <a:r>
+              <a:rPr lang="en-US" b="1" dirty="0" err="1"/>
+              <a:t>stringami</a:t>
+            </a:r>
+            <a:endParaRPr lang="en-US" b="1" dirty="0"/>
+          </a:p>
+          <a:p>
+            <a:r>
+              <a:rPr lang="en-US" dirty="0" err="1"/>
+              <a:t>Nemusi</a:t>
+            </a:r>
+            <a:r>
+              <a:rPr lang="en-US" dirty="0"/>
+              <a:t> </a:t>
+            </a:r>
+            <a:r>
+              <a:rPr lang="en-US" dirty="0" err="1"/>
+              <a:t>byt</a:t>
+            </a:r>
+            <a:r>
+              <a:rPr lang="en-US" dirty="0"/>
+              <a:t> </a:t>
+            </a:r>
+            <a:r>
+              <a:rPr lang="en-US" dirty="0" err="1"/>
+              <a:t>nutne</a:t>
+            </a:r>
+            <a:r>
+              <a:rPr lang="en-US" dirty="0"/>
+              <a:t> </a:t>
+            </a:r>
+            <a:r>
+              <a:rPr lang="en-US" dirty="0" err="1"/>
+              <a:t>funkcia</a:t>
+            </a:r>
+            <a:r>
+              <a:rPr lang="en-US" dirty="0"/>
+              <a:t>, </a:t>
+            </a:r>
+            <a:r>
+              <a:rPr lang="en-US" dirty="0" err="1"/>
+              <a:t>moze</a:t>
+            </a:r>
+            <a:r>
+              <a:rPr lang="en-US" dirty="0"/>
+              <a:t> </a:t>
+            </a:r>
+            <a:r>
+              <a:rPr lang="en-US" dirty="0" err="1"/>
+              <a:t>byt</a:t>
+            </a:r>
+            <a:r>
+              <a:rPr lang="en-US" dirty="0"/>
+              <a:t> </a:t>
+            </a:r>
+            <a:r>
+              <a:rPr lang="en-US" dirty="0" err="1"/>
+              <a:t>aj</a:t>
+            </a:r>
+            <a:r>
+              <a:rPr lang="en-US" dirty="0"/>
+              <a:t> </a:t>
+            </a:r>
+            <a:r>
+              <a:rPr lang="en-US" dirty="0" err="1"/>
+              <a:t>podedenec</a:t>
+            </a:r>
+            <a:r>
+              <a:rPr lang="en-US" dirty="0"/>
+              <a:t> z Transform class, </a:t>
+            </a:r>
+            <a:r>
+              <a:rPr lang="en-US" dirty="0" err="1"/>
+              <a:t>zamysliet</a:t>
+            </a:r>
+            <a:r>
+              <a:rPr lang="en-US" dirty="0"/>
+              <a:t> </a:t>
+            </a:r>
+            <a:r>
+              <a:rPr lang="en-US" dirty="0" err="1"/>
+              <a:t>sa</a:t>
+            </a:r>
+            <a:r>
+              <a:rPr lang="en-US" dirty="0"/>
+              <a:t> </a:t>
+            </a:r>
+            <a:r>
+              <a:rPr lang="en-US" dirty="0" err="1"/>
+              <a:t>nad</a:t>
+            </a:r>
+            <a:r>
+              <a:rPr lang="en-US" dirty="0"/>
+              <a:t> </a:t>
+            </a:r>
+          </a:p>
+          <a:p>
+            <a:pPr lvl="1"/>
+            <a:r>
+              <a:rPr lang="en-US" dirty="0" err="1"/>
+              <a:t>stavovy</a:t>
+            </a:r>
+            <a:r>
+              <a:rPr lang="en-US" dirty="0"/>
+              <a:t> </a:t>
+            </a:r>
+            <a:r>
+              <a:rPr lang="en-US" dirty="0" err="1"/>
+              <a:t>priestor</a:t>
+            </a:r>
+            <a:r>
+              <a:rPr lang="en-US" dirty="0"/>
+              <a:t>  v closure </a:t>
+            </a:r>
+          </a:p>
+          <a:p>
+            <a:pPr lvl="1"/>
+            <a:r>
+              <a:rPr lang="en-US" dirty="0"/>
+              <a:t>vs. </a:t>
+            </a:r>
+            <a:r>
+              <a:rPr lang="en-US" dirty="0" err="1"/>
+              <a:t>stavovy</a:t>
+            </a:r>
+            <a:r>
+              <a:rPr lang="en-US" dirty="0"/>
+              <a:t> </a:t>
+            </a:r>
+            <a:r>
+              <a:rPr lang="en-US" dirty="0" err="1"/>
+              <a:t>priestor</a:t>
+            </a:r>
+            <a:r>
+              <a:rPr lang="en-US" dirty="0"/>
+              <a:t> v </a:t>
+            </a:r>
+            <a:r>
+              <a:rPr lang="en-US" dirty="0" err="1"/>
+              <a:t>objekte</a:t>
+            </a:r>
+            <a:endParaRPr lang="en-US" dirty="0"/>
           </a:p>
         </p:txBody>
       </p:sp>

</xml_diff>

<commit_message>
#8 prednaska a cviko draft
</commit_message>
<xml_diff>
--- a/07-cvicenie/cvicenie07.pptx
+++ b/07-cvicenie/cvicenie07.pptx
@@ -266,7 +266,7 @@
           <a:p>
             <a:fld id="{9D2349FF-49C3-5F4A-AB03-4F06B5BF3E1A}" type="datetimeFigureOut">
               <a:rPr lang="en-US" smtClean="0"/>
-              <a:t>11/5/18</a:t>
+              <a:t>11/8/18</a:t>
             </a:fld>
             <a:endParaRPr lang="en-US"/>
           </a:p>
@@ -464,7 +464,7 @@
           <a:p>
             <a:fld id="{9D2349FF-49C3-5F4A-AB03-4F06B5BF3E1A}" type="datetimeFigureOut">
               <a:rPr lang="en-US" smtClean="0"/>
-              <a:t>11/5/18</a:t>
+              <a:t>11/8/18</a:t>
             </a:fld>
             <a:endParaRPr lang="en-US"/>
           </a:p>
@@ -672,7 +672,7 @@
           <a:p>
             <a:fld id="{9D2349FF-49C3-5F4A-AB03-4F06B5BF3E1A}" type="datetimeFigureOut">
               <a:rPr lang="en-US" smtClean="0"/>
-              <a:t>11/5/18</a:t>
+              <a:t>11/8/18</a:t>
             </a:fld>
             <a:endParaRPr lang="en-US"/>
           </a:p>
@@ -870,7 +870,7 @@
           <a:p>
             <a:fld id="{9D2349FF-49C3-5F4A-AB03-4F06B5BF3E1A}" type="datetimeFigureOut">
               <a:rPr lang="en-US" smtClean="0"/>
-              <a:t>11/5/18</a:t>
+              <a:t>11/8/18</a:t>
             </a:fld>
             <a:endParaRPr lang="en-US"/>
           </a:p>
@@ -1145,7 +1145,7 @@
           <a:p>
             <a:fld id="{9D2349FF-49C3-5F4A-AB03-4F06B5BF3E1A}" type="datetimeFigureOut">
               <a:rPr lang="en-US" smtClean="0"/>
-              <a:t>11/5/18</a:t>
+              <a:t>11/8/18</a:t>
             </a:fld>
             <a:endParaRPr lang="en-US"/>
           </a:p>
@@ -1410,7 +1410,7 @@
           <a:p>
             <a:fld id="{9D2349FF-49C3-5F4A-AB03-4F06B5BF3E1A}" type="datetimeFigureOut">
               <a:rPr lang="en-US" smtClean="0"/>
-              <a:t>11/5/18</a:t>
+              <a:t>11/8/18</a:t>
             </a:fld>
             <a:endParaRPr lang="en-US"/>
           </a:p>
@@ -1822,7 +1822,7 @@
           <a:p>
             <a:fld id="{9D2349FF-49C3-5F4A-AB03-4F06B5BF3E1A}" type="datetimeFigureOut">
               <a:rPr lang="en-US" smtClean="0"/>
-              <a:t>11/5/18</a:t>
+              <a:t>11/8/18</a:t>
             </a:fld>
             <a:endParaRPr lang="en-US"/>
           </a:p>
@@ -1963,7 +1963,7 @@
           <a:p>
             <a:fld id="{9D2349FF-49C3-5F4A-AB03-4F06B5BF3E1A}" type="datetimeFigureOut">
               <a:rPr lang="en-US" smtClean="0"/>
-              <a:t>11/5/18</a:t>
+              <a:t>11/8/18</a:t>
             </a:fld>
             <a:endParaRPr lang="en-US"/>
           </a:p>
@@ -2076,7 +2076,7 @@
           <a:p>
             <a:fld id="{9D2349FF-49C3-5F4A-AB03-4F06B5BF3E1A}" type="datetimeFigureOut">
               <a:rPr lang="en-US" smtClean="0"/>
-              <a:t>11/5/18</a:t>
+              <a:t>11/8/18</a:t>
             </a:fld>
             <a:endParaRPr lang="en-US"/>
           </a:p>
@@ -2387,7 +2387,7 @@
           <a:p>
             <a:fld id="{9D2349FF-49C3-5F4A-AB03-4F06B5BF3E1A}" type="datetimeFigureOut">
               <a:rPr lang="en-US" smtClean="0"/>
-              <a:t>11/5/18</a:t>
+              <a:t>11/8/18</a:t>
             </a:fld>
             <a:endParaRPr lang="en-US"/>
           </a:p>
@@ -2675,7 +2675,7 @@
           <a:p>
             <a:fld id="{9D2349FF-49C3-5F4A-AB03-4F06B5BF3E1A}" type="datetimeFigureOut">
               <a:rPr lang="en-US" smtClean="0"/>
-              <a:t>11/5/18</a:t>
+              <a:t>11/8/18</a:t>
             </a:fld>
             <a:endParaRPr lang="en-US"/>
           </a:p>
@@ -2916,7 +2916,7 @@
           <a:p>
             <a:fld id="{9D2349FF-49C3-5F4A-AB03-4F06B5BF3E1A}" type="datetimeFigureOut">
               <a:rPr lang="en-US" smtClean="0"/>
-              <a:t>11/5/18</a:t>
+              <a:t>11/8/18</a:t>
             </a:fld>
             <a:endParaRPr lang="en-US"/>
           </a:p>
@@ -3469,7 +3469,9 @@
         </p:nvSpPr>
         <p:spPr/>
         <p:txBody>
-          <a:bodyPr/>
+          <a:bodyPr>
+            <a:normAutofit lnSpcReduction="10000"/>
+          </a:bodyPr>
           <a:lstStyle/>
           <a:p>
             <a:r>
@@ -3679,7 +3681,112 @@
             </a:r>
             <a:r>
               <a:rPr lang="en-US" dirty="0"/>
-              <a:t> testy	</a:t>
+              <a:t> testy</a:t>
+            </a:r>
+          </a:p>
+          <a:p>
+            <a:pPr lvl="1"/>
+            <a:endParaRPr lang="en-US" dirty="0"/>
+          </a:p>
+          <a:p>
+            <a:r>
+              <a:rPr lang="en-US" dirty="0" err="1"/>
+              <a:t>Oprava</a:t>
+            </a:r>
+            <a:r>
+              <a:rPr lang="en-US" dirty="0"/>
+              <a:t>:</a:t>
+            </a:r>
+          </a:p>
+          <a:p>
+            <a:pPr lvl="1"/>
+            <a:r>
+              <a:rPr lang="en-US" dirty="0" err="1"/>
+              <a:t>bom</a:t>
+            </a:r>
+            <a:r>
+              <a:rPr lang="en-US" dirty="0"/>
+              <a:t> </a:t>
+            </a:r>
+            <a:r>
+              <a:rPr lang="en-US" dirty="0" err="1"/>
+              <a:t>nerobili</a:t>
+            </a:r>
+            <a:r>
+              <a:rPr lang="en-US" dirty="0"/>
+              <a:t> </a:t>
+            </a:r>
+            <a:r>
+              <a:rPr lang="en-US" dirty="0" err="1"/>
+              <a:t>takze</a:t>
+            </a:r>
+            <a:r>
+              <a:rPr lang="en-US" dirty="0"/>
+              <a:t> </a:t>
+            </a:r>
+            <a:r>
+              <a:rPr lang="en-US" dirty="0" err="1"/>
+              <a:t>je</a:t>
+            </a:r>
+            <a:r>
+              <a:rPr lang="en-US" dirty="0"/>
+              <a:t> to 5 + 2 </a:t>
+            </a:r>
+            <a:r>
+              <a:rPr lang="en-US" dirty="0" err="1"/>
+              <a:t>bonusove</a:t>
+            </a:r>
+            <a:endParaRPr lang="en-US" dirty="0"/>
+          </a:p>
+          <a:p>
+            <a:pPr lvl="1"/>
+            <a:r>
+              <a:rPr lang="en-US" dirty="0" err="1"/>
+              <a:t>bom</a:t>
+            </a:r>
+            <a:r>
+              <a:rPr lang="en-US" dirty="0"/>
+              <a:t> </a:t>
+            </a:r>
+            <a:r>
+              <a:rPr lang="en-US" dirty="0" err="1"/>
+              <a:t>vude</a:t>
+            </a:r>
+            <a:r>
+              <a:rPr lang="en-US" dirty="0"/>
+              <a:t> </a:t>
+            </a:r>
+            <a:r>
+              <a:rPr lang="en-US" dirty="0" err="1"/>
+              <a:t>na</a:t>
+            </a:r>
+            <a:r>
+              <a:rPr lang="en-US" dirty="0"/>
+              <a:t> </a:t>
+            </a:r>
+            <a:r>
+              <a:rPr lang="en-US" dirty="0" err="1"/>
+              <a:t>cviku</a:t>
+            </a:r>
+            <a:r>
+              <a:rPr lang="en-US" dirty="0"/>
+              <a:t> 8 </a:t>
+            </a:r>
+            <a:r>
+              <a:rPr lang="en-US" dirty="0" err="1"/>
+              <a:t>aj</a:t>
+            </a:r>
+            <a:r>
+              <a:rPr lang="en-US" dirty="0"/>
+              <a:t> </a:t>
+            </a:r>
+            <a:r>
+              <a:rPr lang="en-US"/>
+              <a:t>z walkthrough</a:t>
+            </a:r>
+            <a:r>
+              <a:rPr lang="en-US" dirty="0"/>
+              <a:t>	</a:t>
             </a:r>
           </a:p>
         </p:txBody>
@@ -4292,12 +4399,8 @@
           <a:lstStyle/>
           <a:p>
             <a:r>
-              <a:rPr lang="en-US" dirty="0" err="1"/>
-              <a:t>zadanie</a:t>
-            </a:r>
-            <a:r>
-              <a:rPr lang="en-US" dirty="0"/>
-              <a:t> – Writable – object stream to </a:t>
+              <a:rPr lang="en-US" dirty="0"/>
+              <a:t>07-04 – Writable – object stream to </a:t>
             </a:r>
             <a:r>
               <a:rPr lang="en-US" dirty="0" err="1"/>
@@ -4444,12 +4547,8 @@
           <a:lstStyle/>
           <a:p>
             <a:r>
-              <a:rPr lang="en-US" dirty="0" err="1"/>
-              <a:t>zadanie</a:t>
-            </a:r>
-            <a:r>
-              <a:rPr lang="en-US" dirty="0"/>
-              <a:t> – filter, map 1b (+2b bonus)</a:t>
+              <a:rPr lang="en-US" dirty="0"/>
+              <a:t>07-05 – filter, map 1b (+2b bonus)</a:t>
             </a:r>
           </a:p>
         </p:txBody>
@@ -4623,12 +4722,8 @@
           <a:lstStyle/>
           <a:p>
             <a:r>
-              <a:rPr lang="en-US" dirty="0" err="1"/>
-              <a:t>zadanie</a:t>
-            </a:r>
-            <a:r>
-              <a:rPr lang="en-US" dirty="0"/>
-              <a:t> – stateful transform filter, object streams, 1b</a:t>
+              <a:rPr lang="en-US" dirty="0"/>
+              <a:t>07-06 – stateful transform filter, object streams, 1b</a:t>
             </a:r>
           </a:p>
         </p:txBody>

</xml_diff>